<commit_message>
db table view; curve plot
</commit_message>
<xml_diff>
--- a/Migrate to database step-by-step.pptx
+++ b/Migrate to database step-by-step.pptx
@@ -10,6 +10,8 @@
     <p:sldId id="258" r:id="rId4"/>
     <p:sldId id="259" r:id="rId5"/>
     <p:sldId id="260" r:id="rId6"/>
+    <p:sldId id="261" r:id="rId7"/>
+    <p:sldId id="262" r:id="rId8"/>
   </p:sldIdLst>
   <p:sldSz cx="12192000" cy="6858000"/>
   <p:notesSz cx="6858000" cy="9144000"/>
@@ -108,6 +110,11 @@
       </a:defRPr>
     </a:lvl9pPr>
   </p:defaultTextStyle>
+  <p:extLst>
+    <p:ext uri="{EFAFB233-063F-42B5-8137-9DF3F51BA10A}">
+      <p15:sldGuideLst xmlns:p15="http://schemas.microsoft.com/office/powerpoint/2012/main"/>
+    </p:ext>
+  </p:extLst>
 </p:presentation>
 </file>
 
@@ -258,7 +265,7 @@
           <a:p>
             <a:fld id="{9CDCF808-D33E-42B1-8DAA-A8EDE4642D68}" type="datetimeFigureOut">
               <a:rPr lang="en-US" smtClean="0"/>
-              <a:t>8/8/2022</a:t>
+              <a:t>8/15/2022</a:t>
             </a:fld>
             <a:endParaRPr lang="en-US"/>
           </a:p>
@@ -456,7 +463,7 @@
           <a:p>
             <a:fld id="{9CDCF808-D33E-42B1-8DAA-A8EDE4642D68}" type="datetimeFigureOut">
               <a:rPr lang="en-US" smtClean="0"/>
-              <a:t>8/8/2022</a:t>
+              <a:t>8/15/2022</a:t>
             </a:fld>
             <a:endParaRPr lang="en-US"/>
           </a:p>
@@ -664,7 +671,7 @@
           <a:p>
             <a:fld id="{9CDCF808-D33E-42B1-8DAA-A8EDE4642D68}" type="datetimeFigureOut">
               <a:rPr lang="en-US" smtClean="0"/>
-              <a:t>8/8/2022</a:t>
+              <a:t>8/15/2022</a:t>
             </a:fld>
             <a:endParaRPr lang="en-US"/>
           </a:p>
@@ -862,7 +869,7 @@
           <a:p>
             <a:fld id="{9CDCF808-D33E-42B1-8DAA-A8EDE4642D68}" type="datetimeFigureOut">
               <a:rPr lang="en-US" smtClean="0"/>
-              <a:t>8/8/2022</a:t>
+              <a:t>8/15/2022</a:t>
             </a:fld>
             <a:endParaRPr lang="en-US"/>
           </a:p>
@@ -1137,7 +1144,7 @@
           <a:p>
             <a:fld id="{9CDCF808-D33E-42B1-8DAA-A8EDE4642D68}" type="datetimeFigureOut">
               <a:rPr lang="en-US" smtClean="0"/>
-              <a:t>8/8/2022</a:t>
+              <a:t>8/15/2022</a:t>
             </a:fld>
             <a:endParaRPr lang="en-US"/>
           </a:p>
@@ -1402,7 +1409,7 @@
           <a:p>
             <a:fld id="{9CDCF808-D33E-42B1-8DAA-A8EDE4642D68}" type="datetimeFigureOut">
               <a:rPr lang="en-US" smtClean="0"/>
-              <a:t>8/8/2022</a:t>
+              <a:t>8/15/2022</a:t>
             </a:fld>
             <a:endParaRPr lang="en-US"/>
           </a:p>
@@ -1814,7 +1821,7 @@
           <a:p>
             <a:fld id="{9CDCF808-D33E-42B1-8DAA-A8EDE4642D68}" type="datetimeFigureOut">
               <a:rPr lang="en-US" smtClean="0"/>
-              <a:t>8/8/2022</a:t>
+              <a:t>8/15/2022</a:t>
             </a:fld>
             <a:endParaRPr lang="en-US"/>
           </a:p>
@@ -1955,7 +1962,7 @@
           <a:p>
             <a:fld id="{9CDCF808-D33E-42B1-8DAA-A8EDE4642D68}" type="datetimeFigureOut">
               <a:rPr lang="en-US" smtClean="0"/>
-              <a:t>8/8/2022</a:t>
+              <a:t>8/15/2022</a:t>
             </a:fld>
             <a:endParaRPr lang="en-US"/>
           </a:p>
@@ -2068,7 +2075,7 @@
           <a:p>
             <a:fld id="{9CDCF808-D33E-42B1-8DAA-A8EDE4642D68}" type="datetimeFigureOut">
               <a:rPr lang="en-US" smtClean="0"/>
-              <a:t>8/8/2022</a:t>
+              <a:t>8/15/2022</a:t>
             </a:fld>
             <a:endParaRPr lang="en-US"/>
           </a:p>
@@ -2379,7 +2386,7 @@
           <a:p>
             <a:fld id="{9CDCF808-D33E-42B1-8DAA-A8EDE4642D68}" type="datetimeFigureOut">
               <a:rPr lang="en-US" smtClean="0"/>
-              <a:t>8/8/2022</a:t>
+              <a:t>8/15/2022</a:t>
             </a:fld>
             <a:endParaRPr lang="en-US"/>
           </a:p>
@@ -2667,7 +2674,7 @@
           <a:p>
             <a:fld id="{9CDCF808-D33E-42B1-8DAA-A8EDE4642D68}" type="datetimeFigureOut">
               <a:rPr lang="en-US" smtClean="0"/>
-              <a:t>8/8/2022</a:t>
+              <a:t>8/15/2022</a:t>
             </a:fld>
             <a:endParaRPr lang="en-US"/>
           </a:p>
@@ -2908,7 +2915,7 @@
           <a:p>
             <a:fld id="{9CDCF808-D33E-42B1-8DAA-A8EDE4642D68}" type="datetimeFigureOut">
               <a:rPr lang="en-US" smtClean="0"/>
-              <a:t>8/8/2022</a:t>
+              <a:t>8/15/2022</a:t>
             </a:fld>
             <a:endParaRPr lang="en-US"/>
           </a:p>
@@ -3384,7 +3391,7 @@
           <a:p>
             <a:r>
               <a:rPr lang="en-US" dirty="0"/>
-              <a:t>08/08/2022</a:t>
+              <a:t>08/15/2022</a:t>
             </a:r>
           </a:p>
         </p:txBody>
@@ -4323,8 +4330,8 @@
         </p:blipFill>
         <p:spPr bwMode="auto">
           <a:xfrm>
-            <a:off x="6326472" y="2738534"/>
-            <a:ext cx="5865527" cy="2579915"/>
+            <a:off x="4002832" y="3127824"/>
+            <a:ext cx="8024009" cy="3529310"/>
           </a:xfrm>
           <a:prstGeom prst="rect">
             <a:avLst/>
@@ -4471,8 +4478,8 @@
         </p:blipFill>
         <p:spPr bwMode="auto">
           <a:xfrm>
-            <a:off x="6096000" y="129397"/>
-            <a:ext cx="6065717" cy="6363478"/>
+            <a:off x="5831634" y="129396"/>
+            <a:ext cx="6330084" cy="6640823"/>
           </a:xfrm>
           <a:prstGeom prst="rect">
             <a:avLst/>
@@ -4565,8 +4572,8 @@
         </p:nvSpPr>
         <p:spPr>
           <a:xfrm>
-            <a:off x="838200" y="1825625"/>
-            <a:ext cx="6122437" cy="4351338"/>
+            <a:off x="838201" y="1825625"/>
+            <a:ext cx="5908040" cy="4351338"/>
           </a:xfrm>
         </p:spPr>
         <p:txBody>
@@ -4586,7 +4593,7 @@
             </a:pPr>
             <a:r>
               <a:rPr lang="en-US" sz="2400" dirty="0"/>
-              <a:t>I will try out various cloud-based data visualization tools and give an evaluation of each choice to help us decide which tool suit our needs most</a:t>
+              <a:t>Various cloud-based data visualization tools will be tested, and an evaluation of each choice will be given to help us decide which tool suit our needs most</a:t>
             </a:r>
           </a:p>
         </p:txBody>
@@ -4624,6 +4631,538 @@
     <p:extLst>
       <p:ext uri="{BB962C8B-B14F-4D97-AF65-F5344CB8AC3E}">
         <p14:creationId xmlns:p14="http://schemas.microsoft.com/office/powerpoint/2010/main" val="143337170"/>
+      </p:ext>
+    </p:extLst>
+  </p:cSld>
+  <p:clrMapOvr>
+    <a:masterClrMapping/>
+  </p:clrMapOvr>
+</p:sld>
+</file>
+
+<file path=ppt/slides/slide6.xml><?xml version="1.0" encoding="utf-8"?>
+<p:sld xmlns:a="http://schemas.openxmlformats.org/drawingml/2006/main" xmlns:r="http://schemas.openxmlformats.org/officeDocument/2006/relationships" xmlns:p="http://schemas.openxmlformats.org/presentationml/2006/main">
+  <p:cSld>
+    <p:spTree>
+      <p:nvGrpSpPr>
+        <p:cNvPr id="1" name=""/>
+        <p:cNvGrpSpPr/>
+        <p:nvPr/>
+      </p:nvGrpSpPr>
+      <p:grpSpPr>
+        <a:xfrm>
+          <a:off x="0" y="0"/>
+          <a:ext cx="0" cy="0"/>
+          <a:chOff x="0" y="0"/>
+          <a:chExt cx="0" cy="0"/>
+        </a:xfrm>
+      </p:grpSpPr>
+      <p:sp>
+        <p:nvSpPr>
+          <p:cNvPr id="2" name="Title 1">
+            <a:extLst>
+              <a:ext uri="{FF2B5EF4-FFF2-40B4-BE49-F238E27FC236}">
+                <a16:creationId xmlns:a16="http://schemas.microsoft.com/office/drawing/2014/main" id="{5AD46CBE-EBE4-473E-9044-EDBE6D525B03}"/>
+              </a:ext>
+            </a:extLst>
+          </p:cNvPr>
+          <p:cNvSpPr>
+            <a:spLocks noGrp="1"/>
+          </p:cNvSpPr>
+          <p:nvPr>
+            <p:ph type="title"/>
+          </p:nvPr>
+        </p:nvSpPr>
+        <p:spPr/>
+        <p:txBody>
+          <a:bodyPr/>
+          <a:lstStyle/>
+          <a:p>
+            <a:r>
+              <a:rPr lang="en-US" dirty="0"/>
+              <a:t>Current progress</a:t>
+            </a:r>
+          </a:p>
+        </p:txBody>
+      </p:sp>
+      <p:sp>
+        <p:nvSpPr>
+          <p:cNvPr id="3" name="Content Placeholder 2">
+            <a:extLst>
+              <a:ext uri="{FF2B5EF4-FFF2-40B4-BE49-F238E27FC236}">
+                <a16:creationId xmlns:a16="http://schemas.microsoft.com/office/drawing/2014/main" id="{E4899D5F-424F-C502-DA7E-BF5465E96CC2}"/>
+              </a:ext>
+            </a:extLst>
+          </p:cNvPr>
+          <p:cNvSpPr>
+            <a:spLocks noGrp="1"/>
+          </p:cNvSpPr>
+          <p:nvPr>
+            <p:ph idx="1"/>
+          </p:nvPr>
+        </p:nvSpPr>
+        <p:spPr/>
+        <p:txBody>
+          <a:bodyPr/>
+          <a:lstStyle/>
+          <a:p>
+            <a:pPr>
+              <a:lnSpc>
+                <a:spcPts val="3500"/>
+              </a:lnSpc>
+              <a:buFont typeface="Wingdings" panose="05000000000000000000" pitchFamily="2" charset="2"/>
+              <a:buChar char="ü"/>
+            </a:pPr>
+            <a:r>
+              <a:rPr lang="en-US" dirty="0"/>
+              <a:t>Script to combine csv files (raw run data + testlog_S2R) to JSON file</a:t>
+            </a:r>
+          </a:p>
+          <a:p>
+            <a:pPr>
+              <a:lnSpc>
+                <a:spcPts val="3500"/>
+              </a:lnSpc>
+              <a:buFont typeface="Wingdings" panose="05000000000000000000" pitchFamily="2" charset="2"/>
+              <a:buChar char="ü"/>
+            </a:pPr>
+            <a:r>
+              <a:rPr lang="en-US" dirty="0"/>
+              <a:t>Construct MongoDB collection from JSON file (both successfully test on localhost and Atlas)</a:t>
+            </a:r>
+          </a:p>
+          <a:p>
+            <a:pPr>
+              <a:lnSpc>
+                <a:spcPts val="3500"/>
+              </a:lnSpc>
+              <a:buFont typeface="Wingdings" panose="05000000000000000000" pitchFamily="2" charset="2"/>
+              <a:buChar char="Ø"/>
+            </a:pPr>
+            <a:r>
+              <a:rPr lang="en-US" dirty="0"/>
+              <a:t>Python Qt desktop dashboard app to interact with MongoDB</a:t>
+            </a:r>
+          </a:p>
+          <a:p>
+            <a:pPr lvl="1">
+              <a:lnSpc>
+                <a:spcPts val="3500"/>
+              </a:lnSpc>
+              <a:buFont typeface="Wingdings" panose="05000000000000000000" pitchFamily="2" charset="2"/>
+              <a:buChar char="Ø"/>
+            </a:pPr>
+            <a:r>
+              <a:rPr lang="en-US" dirty="0"/>
+              <a:t>Data visualization widget</a:t>
+            </a:r>
+          </a:p>
+          <a:p>
+            <a:pPr lvl="1">
+              <a:lnSpc>
+                <a:spcPts val="3500"/>
+              </a:lnSpc>
+              <a:buFont typeface="Wingdings" panose="05000000000000000000" pitchFamily="2" charset="2"/>
+              <a:buChar char="Ø"/>
+            </a:pPr>
+            <a:r>
+              <a:rPr lang="en-US" dirty="0"/>
+              <a:t>Tests querying and filtering widget</a:t>
+            </a:r>
+          </a:p>
+          <a:p>
+            <a:pPr lvl="1">
+              <a:lnSpc>
+                <a:spcPts val="3500"/>
+              </a:lnSpc>
+              <a:buFont typeface="Wingdings" panose="05000000000000000000" pitchFamily="2" charset="2"/>
+              <a:buChar char="Ø"/>
+            </a:pPr>
+            <a:r>
+              <a:rPr lang="en-US" dirty="0"/>
+              <a:t>User action widget</a:t>
+            </a:r>
+          </a:p>
+          <a:p>
+            <a:pPr lvl="1">
+              <a:lnSpc>
+                <a:spcPts val="3500"/>
+              </a:lnSpc>
+              <a:buFont typeface="Wingdings" panose="05000000000000000000" pitchFamily="2" charset="2"/>
+              <a:buChar char="Ø"/>
+            </a:pPr>
+            <a:r>
+              <a:rPr lang="en-US" dirty="0"/>
+              <a:t>Etc..</a:t>
+            </a:r>
+          </a:p>
+        </p:txBody>
+      </p:sp>
+    </p:spTree>
+    <p:extLst>
+      <p:ext uri="{BB962C8B-B14F-4D97-AF65-F5344CB8AC3E}">
+        <p14:creationId xmlns:p14="http://schemas.microsoft.com/office/powerpoint/2010/main" val="1784177501"/>
+      </p:ext>
+    </p:extLst>
+  </p:cSld>
+  <p:clrMapOvr>
+    <a:masterClrMapping/>
+  </p:clrMapOvr>
+</p:sld>
+</file>
+
+<file path=ppt/slides/slide7.xml><?xml version="1.0" encoding="utf-8"?>
+<p:sld xmlns:a="http://schemas.openxmlformats.org/drawingml/2006/main" xmlns:r="http://schemas.openxmlformats.org/officeDocument/2006/relationships" xmlns:p="http://schemas.openxmlformats.org/presentationml/2006/main">
+  <p:cSld>
+    <p:spTree>
+      <p:nvGrpSpPr>
+        <p:cNvPr id="1" name=""/>
+        <p:cNvGrpSpPr/>
+        <p:nvPr/>
+      </p:nvGrpSpPr>
+      <p:grpSpPr>
+        <a:xfrm>
+          <a:off x="0" y="0"/>
+          <a:ext cx="0" cy="0"/>
+          <a:chOff x="0" y="0"/>
+          <a:chExt cx="0" cy="0"/>
+        </a:xfrm>
+      </p:grpSpPr>
+      <p:sp>
+        <p:nvSpPr>
+          <p:cNvPr id="2" name="Title 1">
+            <a:extLst>
+              <a:ext uri="{FF2B5EF4-FFF2-40B4-BE49-F238E27FC236}">
+                <a16:creationId xmlns:a16="http://schemas.microsoft.com/office/drawing/2014/main" id="{66A92DC9-7E71-3437-B6AB-6A218AC981D6}"/>
+              </a:ext>
+            </a:extLst>
+          </p:cNvPr>
+          <p:cNvSpPr>
+            <a:spLocks noGrp="1"/>
+          </p:cNvSpPr>
+          <p:nvPr>
+            <p:ph type="title"/>
+          </p:nvPr>
+        </p:nvSpPr>
+        <p:spPr/>
+        <p:txBody>
+          <a:bodyPr/>
+          <a:lstStyle/>
+          <a:p>
+            <a:r>
+              <a:rPr lang="en-US" dirty="0"/>
+              <a:t>Features planning for the dashboard app</a:t>
+            </a:r>
+          </a:p>
+        </p:txBody>
+      </p:sp>
+      <p:pic>
+        <p:nvPicPr>
+          <p:cNvPr id="4" name="Picture 3">
+            <a:extLst>
+              <a:ext uri="{FF2B5EF4-FFF2-40B4-BE49-F238E27FC236}">
+                <a16:creationId xmlns:a16="http://schemas.microsoft.com/office/drawing/2014/main" id="{BD180D44-529F-6102-972C-3B2F5DCC4E9A}"/>
+              </a:ext>
+            </a:extLst>
+          </p:cNvPr>
+          <p:cNvPicPr>
+            <a:picLocks noChangeAspect="1"/>
+          </p:cNvPicPr>
+          <p:nvPr/>
+        </p:nvPicPr>
+        <p:blipFill>
+          <a:blip r:embed="rId2"/>
+          <a:stretch>
+            <a:fillRect/>
+          </a:stretch>
+        </p:blipFill>
+        <p:spPr>
+          <a:xfrm>
+            <a:off x="1781813" y="1317463"/>
+            <a:ext cx="8628373" cy="5540537"/>
+          </a:xfrm>
+          <a:prstGeom prst="rect">
+            <a:avLst/>
+          </a:prstGeom>
+        </p:spPr>
+      </p:pic>
+      <p:sp>
+        <p:nvSpPr>
+          <p:cNvPr id="5" name="Rectangle: Rounded Corners 4">
+            <a:extLst>
+              <a:ext uri="{FF2B5EF4-FFF2-40B4-BE49-F238E27FC236}">
+                <a16:creationId xmlns:a16="http://schemas.microsoft.com/office/drawing/2014/main" id="{B1D0CC20-9C30-CD9D-4E6E-F2302EB13D89}"/>
+              </a:ext>
+            </a:extLst>
+          </p:cNvPr>
+          <p:cNvSpPr/>
+          <p:nvPr/>
+        </p:nvSpPr>
+        <p:spPr>
+          <a:xfrm>
+            <a:off x="8304245" y="1690686"/>
+            <a:ext cx="2043404" cy="4299567"/>
+          </a:xfrm>
+          <a:prstGeom prst="roundRect">
+            <a:avLst/>
+          </a:prstGeom>
+          <a:noFill/>
+          <a:ln w="38100">
+            <a:solidFill>
+              <a:srgbClr val="00B0F0"/>
+            </a:solidFill>
+            <a:prstDash val="dash"/>
+          </a:ln>
+        </p:spPr>
+        <p:style>
+          <a:lnRef idx="2">
+            <a:schemeClr val="accent1">
+              <a:shade val="50000"/>
+            </a:schemeClr>
+          </a:lnRef>
+          <a:fillRef idx="1">
+            <a:schemeClr val="accent1"/>
+          </a:fillRef>
+          <a:effectRef idx="0">
+            <a:schemeClr val="accent1"/>
+          </a:effectRef>
+          <a:fontRef idx="minor">
+            <a:schemeClr val="lt1"/>
+          </a:fontRef>
+        </p:style>
+        <p:txBody>
+          <a:bodyPr rtlCol="0" anchor="ctr"/>
+          <a:lstStyle/>
+          <a:p>
+            <a:pPr algn="ctr"/>
+            <a:endParaRPr lang="en-US"/>
+          </a:p>
+        </p:txBody>
+      </p:sp>
+      <p:sp>
+        <p:nvSpPr>
+          <p:cNvPr id="6" name="Rectangle: Rounded Corners 5">
+            <a:extLst>
+              <a:ext uri="{FF2B5EF4-FFF2-40B4-BE49-F238E27FC236}">
+                <a16:creationId xmlns:a16="http://schemas.microsoft.com/office/drawing/2014/main" id="{039D350A-F048-032B-C513-BF28D1DACEB9}"/>
+              </a:ext>
+            </a:extLst>
+          </p:cNvPr>
+          <p:cNvSpPr/>
+          <p:nvPr/>
+        </p:nvSpPr>
+        <p:spPr>
+          <a:xfrm>
+            <a:off x="1781813" y="1690688"/>
+            <a:ext cx="6522432" cy="5055345"/>
+          </a:xfrm>
+          <a:prstGeom prst="roundRect">
+            <a:avLst/>
+          </a:prstGeom>
+          <a:noFill/>
+          <a:ln w="38100">
+            <a:solidFill>
+              <a:srgbClr val="00B0F0"/>
+            </a:solidFill>
+            <a:prstDash val="dash"/>
+          </a:ln>
+        </p:spPr>
+        <p:style>
+          <a:lnRef idx="2">
+            <a:schemeClr val="accent1">
+              <a:shade val="50000"/>
+            </a:schemeClr>
+          </a:lnRef>
+          <a:fillRef idx="1">
+            <a:schemeClr val="accent1"/>
+          </a:fillRef>
+          <a:effectRef idx="0">
+            <a:schemeClr val="accent1"/>
+          </a:effectRef>
+          <a:fontRef idx="minor">
+            <a:schemeClr val="lt1"/>
+          </a:fontRef>
+        </p:style>
+        <p:txBody>
+          <a:bodyPr rtlCol="0" anchor="ctr"/>
+          <a:lstStyle/>
+          <a:p>
+            <a:pPr algn="ctr"/>
+            <a:endParaRPr lang="en-US"/>
+          </a:p>
+        </p:txBody>
+      </p:sp>
+      <p:sp>
+        <p:nvSpPr>
+          <p:cNvPr id="7" name="Rectangle: Rounded Corners 6">
+            <a:extLst>
+              <a:ext uri="{FF2B5EF4-FFF2-40B4-BE49-F238E27FC236}">
+                <a16:creationId xmlns:a16="http://schemas.microsoft.com/office/drawing/2014/main" id="{BE7C05D6-1096-E134-F7C6-D7C700AA2128}"/>
+              </a:ext>
+            </a:extLst>
+          </p:cNvPr>
+          <p:cNvSpPr/>
+          <p:nvPr/>
+        </p:nvSpPr>
+        <p:spPr>
+          <a:xfrm>
+            <a:off x="8229600" y="5990253"/>
+            <a:ext cx="2118049" cy="755782"/>
+          </a:xfrm>
+          <a:prstGeom prst="roundRect">
+            <a:avLst/>
+          </a:prstGeom>
+          <a:noFill/>
+          <a:ln w="38100">
+            <a:solidFill>
+              <a:srgbClr val="00B0F0"/>
+            </a:solidFill>
+            <a:prstDash val="dash"/>
+          </a:ln>
+        </p:spPr>
+        <p:style>
+          <a:lnRef idx="2">
+            <a:schemeClr val="accent1">
+              <a:shade val="50000"/>
+            </a:schemeClr>
+          </a:lnRef>
+          <a:fillRef idx="1">
+            <a:schemeClr val="accent1"/>
+          </a:fillRef>
+          <a:effectRef idx="0">
+            <a:schemeClr val="accent1"/>
+          </a:effectRef>
+          <a:fontRef idx="minor">
+            <a:schemeClr val="lt1"/>
+          </a:fontRef>
+        </p:style>
+        <p:txBody>
+          <a:bodyPr rtlCol="0" anchor="ctr"/>
+          <a:lstStyle/>
+          <a:p>
+            <a:pPr algn="ctr"/>
+            <a:endParaRPr lang="en-US"/>
+          </a:p>
+        </p:txBody>
+      </p:sp>
+      <p:sp>
+        <p:nvSpPr>
+          <p:cNvPr id="8" name="TextBox 7">
+            <a:extLst>
+              <a:ext uri="{FF2B5EF4-FFF2-40B4-BE49-F238E27FC236}">
+                <a16:creationId xmlns:a16="http://schemas.microsoft.com/office/drawing/2014/main" id="{2A5133DB-AC07-5486-3AFB-2B0F993CD17C}"/>
+              </a:ext>
+            </a:extLst>
+          </p:cNvPr>
+          <p:cNvSpPr txBox="1"/>
+          <p:nvPr/>
+        </p:nvSpPr>
+        <p:spPr>
+          <a:xfrm>
+            <a:off x="3977950" y="4218360"/>
+            <a:ext cx="2118049" cy="646331"/>
+          </a:xfrm>
+          <a:prstGeom prst="rect">
+            <a:avLst/>
+          </a:prstGeom>
+          <a:noFill/>
+        </p:spPr>
+        <p:txBody>
+          <a:bodyPr wrap="square" rtlCol="0">
+            <a:spAutoFit/>
+          </a:bodyPr>
+          <a:lstStyle/>
+          <a:p>
+            <a:r>
+              <a:rPr lang="en-US" dirty="0"/>
+              <a:t>Interactive test data visualization widget </a:t>
+            </a:r>
+          </a:p>
+        </p:txBody>
+      </p:sp>
+      <p:sp>
+        <p:nvSpPr>
+          <p:cNvPr id="9" name="TextBox 8">
+            <a:extLst>
+              <a:ext uri="{FF2B5EF4-FFF2-40B4-BE49-F238E27FC236}">
+                <a16:creationId xmlns:a16="http://schemas.microsoft.com/office/drawing/2014/main" id="{E593D36E-920D-420E-01A8-73EA28523D59}"/>
+              </a:ext>
+            </a:extLst>
+          </p:cNvPr>
+          <p:cNvSpPr txBox="1"/>
+          <p:nvPr/>
+        </p:nvSpPr>
+        <p:spPr>
+          <a:xfrm>
+            <a:off x="8463135" y="3194139"/>
+            <a:ext cx="1788160" cy="646331"/>
+          </a:xfrm>
+          <a:prstGeom prst="rect">
+            <a:avLst/>
+          </a:prstGeom>
+          <a:noFill/>
+        </p:spPr>
+        <p:txBody>
+          <a:bodyPr wrap="square" rtlCol="0">
+            <a:spAutoFit/>
+          </a:bodyPr>
+          <a:lstStyle/>
+          <a:p>
+            <a:pPr algn="ctr"/>
+            <a:r>
+              <a:rPr lang="en-US" dirty="0"/>
+              <a:t>Tests querying</a:t>
+            </a:r>
+          </a:p>
+          <a:p>
+            <a:pPr algn="ctr"/>
+            <a:r>
+              <a:rPr lang="en-US" dirty="0"/>
+              <a:t>filtering widget</a:t>
+            </a:r>
+          </a:p>
+        </p:txBody>
+      </p:sp>
+      <p:sp>
+        <p:nvSpPr>
+          <p:cNvPr id="10" name="TextBox 9">
+            <a:extLst>
+              <a:ext uri="{FF2B5EF4-FFF2-40B4-BE49-F238E27FC236}">
+                <a16:creationId xmlns:a16="http://schemas.microsoft.com/office/drawing/2014/main" id="{35EE8D0D-3EB8-66DA-55D2-1021626E6DE2}"/>
+              </a:ext>
+            </a:extLst>
+          </p:cNvPr>
+          <p:cNvSpPr txBox="1"/>
+          <p:nvPr/>
+        </p:nvSpPr>
+        <p:spPr>
+          <a:xfrm>
+            <a:off x="10403840" y="6183478"/>
+            <a:ext cx="1788160" cy="369332"/>
+          </a:xfrm>
+          <a:prstGeom prst="rect">
+            <a:avLst/>
+          </a:prstGeom>
+          <a:noFill/>
+        </p:spPr>
+        <p:txBody>
+          <a:bodyPr wrap="square" rtlCol="0">
+            <a:spAutoFit/>
+          </a:bodyPr>
+          <a:lstStyle/>
+          <a:p>
+            <a:pPr algn="ctr"/>
+            <a:r>
+              <a:rPr lang="en-US" dirty="0"/>
+              <a:t>Action widget</a:t>
+            </a:r>
+          </a:p>
+        </p:txBody>
+      </p:sp>
+    </p:spTree>
+    <p:extLst>
+      <p:ext uri="{BB962C8B-B14F-4D97-AF65-F5344CB8AC3E}">
+        <p14:creationId xmlns:p14="http://schemas.microsoft.com/office/powerpoint/2010/main" val="3088193296"/>
       </p:ext>
     </p:extLst>
   </p:cSld>

</xml_diff>

<commit_message>
add/delete tests, select folder
</commit_message>
<xml_diff>
--- a/Migrate to database step-by-step.pptx
+++ b/Migrate to database step-by-step.pptx
@@ -12,6 +12,10 @@
     <p:sldId id="260" r:id="rId6"/>
     <p:sldId id="262" r:id="rId7"/>
     <p:sldId id="261" r:id="rId8"/>
+    <p:sldId id="263" r:id="rId9"/>
+    <p:sldId id="264" r:id="rId10"/>
+    <p:sldId id="265" r:id="rId11"/>
+    <p:sldId id="266" r:id="rId12"/>
   </p:sldIdLst>
   <p:sldSz cx="12192000" cy="6858000"/>
   <p:notesSz cx="6858000" cy="9144000"/>
@@ -265,7 +269,7 @@
           <a:p>
             <a:fld id="{9CDCF808-D33E-42B1-8DAA-A8EDE4642D68}" type="datetimeFigureOut">
               <a:rPr lang="en-US" smtClean="0"/>
-              <a:t>8/22/2022</a:t>
+              <a:t>10/4/2022</a:t>
             </a:fld>
             <a:endParaRPr lang="en-US"/>
           </a:p>
@@ -463,7 +467,7 @@
           <a:p>
             <a:fld id="{9CDCF808-D33E-42B1-8DAA-A8EDE4642D68}" type="datetimeFigureOut">
               <a:rPr lang="en-US" smtClean="0"/>
-              <a:t>8/22/2022</a:t>
+              <a:t>10/4/2022</a:t>
             </a:fld>
             <a:endParaRPr lang="en-US"/>
           </a:p>
@@ -671,7 +675,7 @@
           <a:p>
             <a:fld id="{9CDCF808-D33E-42B1-8DAA-A8EDE4642D68}" type="datetimeFigureOut">
               <a:rPr lang="en-US" smtClean="0"/>
-              <a:t>8/22/2022</a:t>
+              <a:t>10/4/2022</a:t>
             </a:fld>
             <a:endParaRPr lang="en-US"/>
           </a:p>
@@ -869,7 +873,7 @@
           <a:p>
             <a:fld id="{9CDCF808-D33E-42B1-8DAA-A8EDE4642D68}" type="datetimeFigureOut">
               <a:rPr lang="en-US" smtClean="0"/>
-              <a:t>8/22/2022</a:t>
+              <a:t>10/4/2022</a:t>
             </a:fld>
             <a:endParaRPr lang="en-US"/>
           </a:p>
@@ -1144,7 +1148,7 @@
           <a:p>
             <a:fld id="{9CDCF808-D33E-42B1-8DAA-A8EDE4642D68}" type="datetimeFigureOut">
               <a:rPr lang="en-US" smtClean="0"/>
-              <a:t>8/22/2022</a:t>
+              <a:t>10/4/2022</a:t>
             </a:fld>
             <a:endParaRPr lang="en-US"/>
           </a:p>
@@ -1409,7 +1413,7 @@
           <a:p>
             <a:fld id="{9CDCF808-D33E-42B1-8DAA-A8EDE4642D68}" type="datetimeFigureOut">
               <a:rPr lang="en-US" smtClean="0"/>
-              <a:t>8/22/2022</a:t>
+              <a:t>10/4/2022</a:t>
             </a:fld>
             <a:endParaRPr lang="en-US"/>
           </a:p>
@@ -1821,7 +1825,7 @@
           <a:p>
             <a:fld id="{9CDCF808-D33E-42B1-8DAA-A8EDE4642D68}" type="datetimeFigureOut">
               <a:rPr lang="en-US" smtClean="0"/>
-              <a:t>8/22/2022</a:t>
+              <a:t>10/4/2022</a:t>
             </a:fld>
             <a:endParaRPr lang="en-US"/>
           </a:p>
@@ -1962,7 +1966,7 @@
           <a:p>
             <a:fld id="{9CDCF808-D33E-42B1-8DAA-A8EDE4642D68}" type="datetimeFigureOut">
               <a:rPr lang="en-US" smtClean="0"/>
-              <a:t>8/22/2022</a:t>
+              <a:t>10/4/2022</a:t>
             </a:fld>
             <a:endParaRPr lang="en-US"/>
           </a:p>
@@ -2075,7 +2079,7 @@
           <a:p>
             <a:fld id="{9CDCF808-D33E-42B1-8DAA-A8EDE4642D68}" type="datetimeFigureOut">
               <a:rPr lang="en-US" smtClean="0"/>
-              <a:t>8/22/2022</a:t>
+              <a:t>10/4/2022</a:t>
             </a:fld>
             <a:endParaRPr lang="en-US"/>
           </a:p>
@@ -2386,7 +2390,7 @@
           <a:p>
             <a:fld id="{9CDCF808-D33E-42B1-8DAA-A8EDE4642D68}" type="datetimeFigureOut">
               <a:rPr lang="en-US" smtClean="0"/>
-              <a:t>8/22/2022</a:t>
+              <a:t>10/4/2022</a:t>
             </a:fld>
             <a:endParaRPr lang="en-US"/>
           </a:p>
@@ -2674,7 +2678,7 @@
           <a:p>
             <a:fld id="{9CDCF808-D33E-42B1-8DAA-A8EDE4642D68}" type="datetimeFigureOut">
               <a:rPr lang="en-US" smtClean="0"/>
-              <a:t>8/22/2022</a:t>
+              <a:t>10/4/2022</a:t>
             </a:fld>
             <a:endParaRPr lang="en-US"/>
           </a:p>
@@ -2915,7 +2919,7 @@
           <a:p>
             <a:fld id="{9CDCF808-D33E-42B1-8DAA-A8EDE4642D68}" type="datetimeFigureOut">
               <a:rPr lang="en-US" smtClean="0"/>
-              <a:t>8/22/2022</a:t>
+              <a:t>10/4/2022</a:t>
             </a:fld>
             <a:endParaRPr lang="en-US"/>
           </a:p>
@@ -3409,6 +3413,232 @@
 </p:sld>
 </file>
 
+<file path=ppt/slides/slide10.xml><?xml version="1.0" encoding="utf-8"?>
+<p:sld xmlns:a="http://schemas.openxmlformats.org/drawingml/2006/main" xmlns:r="http://schemas.openxmlformats.org/officeDocument/2006/relationships" xmlns:p="http://schemas.openxmlformats.org/presentationml/2006/main">
+  <p:cSld>
+    <p:spTree>
+      <p:nvGrpSpPr>
+        <p:cNvPr id="1" name=""/>
+        <p:cNvGrpSpPr/>
+        <p:nvPr/>
+      </p:nvGrpSpPr>
+      <p:grpSpPr>
+        <a:xfrm>
+          <a:off x="0" y="0"/>
+          <a:ext cx="0" cy="0"/>
+          <a:chOff x="0" y="0"/>
+          <a:chExt cx="0" cy="0"/>
+        </a:xfrm>
+      </p:grpSpPr>
+      <p:sp>
+        <p:nvSpPr>
+          <p:cNvPr id="2" name="Title 1">
+            <a:extLst>
+              <a:ext uri="{FF2B5EF4-FFF2-40B4-BE49-F238E27FC236}">
+                <a16:creationId xmlns:a16="http://schemas.microsoft.com/office/drawing/2014/main" id="{5CFC92BE-5CFF-2819-AFE3-47298EA2159D}"/>
+              </a:ext>
+            </a:extLst>
+          </p:cNvPr>
+          <p:cNvSpPr>
+            <a:spLocks noGrp="1"/>
+          </p:cNvSpPr>
+          <p:nvPr>
+            <p:ph type="title"/>
+          </p:nvPr>
+        </p:nvSpPr>
+        <p:spPr/>
+        <p:txBody>
+          <a:bodyPr/>
+          <a:lstStyle/>
+          <a:p>
+            <a:r>
+              <a:rPr lang="en-US" dirty="0"/>
+              <a:t>Concept of NoSQL-SQL hybrid setup</a:t>
+            </a:r>
+          </a:p>
+        </p:txBody>
+      </p:sp>
+      <p:sp>
+        <p:nvSpPr>
+          <p:cNvPr id="3" name="Content Placeholder 2">
+            <a:extLst>
+              <a:ext uri="{FF2B5EF4-FFF2-40B4-BE49-F238E27FC236}">
+                <a16:creationId xmlns:a16="http://schemas.microsoft.com/office/drawing/2014/main" id="{7ED1452C-C20D-4D6B-FDBC-94AE9D17BFEB}"/>
+              </a:ext>
+            </a:extLst>
+          </p:cNvPr>
+          <p:cNvSpPr>
+            <a:spLocks noGrp="1"/>
+          </p:cNvSpPr>
+          <p:nvPr>
+            <p:ph idx="1"/>
+          </p:nvPr>
+        </p:nvSpPr>
+        <p:spPr/>
+        <p:txBody>
+          <a:bodyPr/>
+          <a:lstStyle/>
+          <a:p>
+            <a:endParaRPr lang="en-US"/>
+          </a:p>
+        </p:txBody>
+      </p:sp>
+      <p:pic>
+        <p:nvPicPr>
+          <p:cNvPr id="4" name="Picture 3">
+            <a:extLst>
+              <a:ext uri="{FF2B5EF4-FFF2-40B4-BE49-F238E27FC236}">
+                <a16:creationId xmlns:a16="http://schemas.microsoft.com/office/drawing/2014/main" id="{DB03655E-321B-9A8E-8923-13A8118010FB}"/>
+              </a:ext>
+            </a:extLst>
+          </p:cNvPr>
+          <p:cNvPicPr>
+            <a:picLocks noChangeAspect="1"/>
+          </p:cNvPicPr>
+          <p:nvPr/>
+        </p:nvPicPr>
+        <p:blipFill>
+          <a:blip r:embed="rId2"/>
+          <a:stretch>
+            <a:fillRect/>
+          </a:stretch>
+        </p:blipFill>
+        <p:spPr>
+          <a:xfrm>
+            <a:off x="1416168" y="2491273"/>
+            <a:ext cx="9461239" cy="3470987"/>
+          </a:xfrm>
+          <a:prstGeom prst="rect">
+            <a:avLst/>
+          </a:prstGeom>
+        </p:spPr>
+      </p:pic>
+    </p:spTree>
+    <p:extLst>
+      <p:ext uri="{BB962C8B-B14F-4D97-AF65-F5344CB8AC3E}">
+        <p14:creationId xmlns:p14="http://schemas.microsoft.com/office/powerpoint/2010/main" val="184289883"/>
+      </p:ext>
+    </p:extLst>
+  </p:cSld>
+  <p:clrMapOvr>
+    <a:masterClrMapping/>
+  </p:clrMapOvr>
+</p:sld>
+</file>
+
+<file path=ppt/slides/slide11.xml><?xml version="1.0" encoding="utf-8"?>
+<p:sld xmlns:a="http://schemas.openxmlformats.org/drawingml/2006/main" xmlns:r="http://schemas.openxmlformats.org/officeDocument/2006/relationships" xmlns:p="http://schemas.openxmlformats.org/presentationml/2006/main">
+  <p:cSld>
+    <p:spTree>
+      <p:nvGrpSpPr>
+        <p:cNvPr id="1" name=""/>
+        <p:cNvGrpSpPr/>
+        <p:nvPr/>
+      </p:nvGrpSpPr>
+      <p:grpSpPr>
+        <a:xfrm>
+          <a:off x="0" y="0"/>
+          <a:ext cx="0" cy="0"/>
+          <a:chOff x="0" y="0"/>
+          <a:chExt cx="0" cy="0"/>
+        </a:xfrm>
+      </p:grpSpPr>
+      <p:sp>
+        <p:nvSpPr>
+          <p:cNvPr id="2" name="Title 1">
+            <a:extLst>
+              <a:ext uri="{FF2B5EF4-FFF2-40B4-BE49-F238E27FC236}">
+                <a16:creationId xmlns:a16="http://schemas.microsoft.com/office/drawing/2014/main" id="{D0CE7B90-1144-859E-72F5-800B716F76B1}"/>
+              </a:ext>
+            </a:extLst>
+          </p:cNvPr>
+          <p:cNvSpPr>
+            <a:spLocks noGrp="1"/>
+          </p:cNvSpPr>
+          <p:nvPr>
+            <p:ph type="title"/>
+          </p:nvPr>
+        </p:nvSpPr>
+        <p:spPr/>
+        <p:txBody>
+          <a:bodyPr/>
+          <a:lstStyle/>
+          <a:p>
+            <a:r>
+              <a:rPr lang="en-US" dirty="0"/>
+              <a:t>Data schema for test log database (SQL)</a:t>
+            </a:r>
+          </a:p>
+        </p:txBody>
+      </p:sp>
+      <p:sp>
+        <p:nvSpPr>
+          <p:cNvPr id="3" name="Content Placeholder 2">
+            <a:extLst>
+              <a:ext uri="{FF2B5EF4-FFF2-40B4-BE49-F238E27FC236}">
+                <a16:creationId xmlns:a16="http://schemas.microsoft.com/office/drawing/2014/main" id="{4E23F7A6-ADA2-8B52-A139-E6974E2340C5}"/>
+              </a:ext>
+            </a:extLst>
+          </p:cNvPr>
+          <p:cNvSpPr>
+            <a:spLocks noGrp="1"/>
+          </p:cNvSpPr>
+          <p:nvPr>
+            <p:ph idx="1"/>
+          </p:nvPr>
+        </p:nvSpPr>
+        <p:spPr/>
+        <p:txBody>
+          <a:bodyPr/>
+          <a:lstStyle/>
+          <a:p>
+            <a:endParaRPr lang="en-US"/>
+          </a:p>
+        </p:txBody>
+      </p:sp>
+      <p:pic>
+        <p:nvPicPr>
+          <p:cNvPr id="4" name="Picture 3">
+            <a:extLst>
+              <a:ext uri="{FF2B5EF4-FFF2-40B4-BE49-F238E27FC236}">
+                <a16:creationId xmlns:a16="http://schemas.microsoft.com/office/drawing/2014/main" id="{BBD384A1-E29D-6A54-EACD-4CA32DE48827}"/>
+              </a:ext>
+            </a:extLst>
+          </p:cNvPr>
+          <p:cNvPicPr>
+            <a:picLocks noChangeAspect="1"/>
+          </p:cNvPicPr>
+          <p:nvPr/>
+        </p:nvPicPr>
+        <p:blipFill>
+          <a:blip r:embed="rId2"/>
+          <a:stretch>
+            <a:fillRect/>
+          </a:stretch>
+        </p:blipFill>
+        <p:spPr>
+          <a:xfrm>
+            <a:off x="2397967" y="1735422"/>
+            <a:ext cx="8360906" cy="5122578"/>
+          </a:xfrm>
+          <a:prstGeom prst="rect">
+            <a:avLst/>
+          </a:prstGeom>
+        </p:spPr>
+      </p:pic>
+    </p:spTree>
+    <p:extLst>
+      <p:ext uri="{BB962C8B-B14F-4D97-AF65-F5344CB8AC3E}">
+        <p14:creationId xmlns:p14="http://schemas.microsoft.com/office/powerpoint/2010/main" val="1610825255"/>
+      </p:ext>
+    </p:extLst>
+  </p:cSld>
+  <p:clrMapOvr>
+    <a:masterClrMapping/>
+  </p:clrMapOvr>
+</p:sld>
+</file>
+
 <file path=ppt/slides/slide2.xml><?xml version="1.0" encoding="utf-8"?>
 <p:sld xmlns:a="http://schemas.openxmlformats.org/drawingml/2006/main" xmlns:r="http://schemas.openxmlformats.org/officeDocument/2006/relationships" xmlns:p="http://schemas.openxmlformats.org/presentationml/2006/main">
   <p:cSld>
@@ -4673,7 +4903,12 @@
             <p:ph type="title"/>
           </p:nvPr>
         </p:nvSpPr>
-        <p:spPr/>
+        <p:spPr>
+          <a:xfrm>
+            <a:off x="832267" y="-105441"/>
+            <a:ext cx="10515600" cy="1325563"/>
+          </a:xfrm>
+        </p:spPr>
         <p:txBody>
           <a:bodyPr/>
           <a:lstStyle/>
@@ -4687,10 +4922,10 @@
       </p:sp>
       <p:grpSp>
         <p:nvGrpSpPr>
-          <p:cNvPr id="13" name="Group 12">
-            <a:extLst>
-              <a:ext uri="{FF2B5EF4-FFF2-40B4-BE49-F238E27FC236}">
-                <a16:creationId xmlns:a16="http://schemas.microsoft.com/office/drawing/2014/main" id="{AA0330D4-C7BA-9D27-6239-675E805B7B6A}"/>
+          <p:cNvPr id="16" name="Group 15">
+            <a:extLst>
+              <a:ext uri="{FF2B5EF4-FFF2-40B4-BE49-F238E27FC236}">
+                <a16:creationId xmlns:a16="http://schemas.microsoft.com/office/drawing/2014/main" id="{260E5557-FEEB-0999-D593-C84401D0CB6D}"/>
               </a:ext>
             </a:extLst>
           </p:cNvPr>
@@ -4699,18 +4934,18 @@
         </p:nvGrpSpPr>
         <p:grpSpPr>
           <a:xfrm>
-            <a:off x="1555092" y="1132535"/>
-            <a:ext cx="9081816" cy="5605196"/>
-            <a:chOff x="1555092" y="1132535"/>
-            <a:chExt cx="9081816" cy="5605196"/>
+            <a:off x="1507907" y="795764"/>
+            <a:ext cx="9845893" cy="6452594"/>
+            <a:chOff x="1507907" y="795764"/>
+            <a:chExt cx="9845893" cy="6452594"/>
           </a:xfrm>
         </p:grpSpPr>
         <p:pic>
           <p:nvPicPr>
-            <p:cNvPr id="12" name="Picture 11">
+            <p:cNvPr id="3" name="Picture 2">
               <a:extLst>
                 <a:ext uri="{FF2B5EF4-FFF2-40B4-BE49-F238E27FC236}">
-                  <a16:creationId xmlns:a16="http://schemas.microsoft.com/office/drawing/2014/main" id="{41B36CF3-B09C-0220-C75F-186C6BC979B4}"/>
+                  <a16:creationId xmlns:a16="http://schemas.microsoft.com/office/drawing/2014/main" id="{AAED2850-B38D-A6A3-FD81-C06A98BA4C05}"/>
                 </a:ext>
               </a:extLst>
             </p:cNvPr>
@@ -4727,8 +4962,8 @@
           </p:blipFill>
           <p:spPr>
             <a:xfrm>
-              <a:off x="1555092" y="1422405"/>
-              <a:ext cx="9081816" cy="5315326"/>
+              <a:off x="1507907" y="1132535"/>
+              <a:ext cx="9845893" cy="5776461"/>
             </a:xfrm>
             <a:prstGeom prst="rect">
               <a:avLst/>
@@ -4749,10 +4984,10 @@
           </p:nvGrpSpPr>
           <p:grpSpPr>
             <a:xfrm>
-              <a:off x="1555092" y="1132535"/>
-              <a:ext cx="9081815" cy="5605196"/>
-              <a:chOff x="1555092" y="1132535"/>
-              <a:chExt cx="9081815" cy="5605196"/>
+              <a:off x="1507907" y="795764"/>
+              <a:ext cx="9775310" cy="6452594"/>
+              <a:chOff x="1507907" y="851748"/>
+              <a:chExt cx="9775310" cy="6452594"/>
             </a:xfrm>
           </p:grpSpPr>
           <p:sp>
@@ -4769,7 +5004,7 @@
             </p:nvSpPr>
             <p:spPr>
               <a:xfrm>
-                <a:off x="8463134" y="1682382"/>
+                <a:off x="8953247" y="1481882"/>
                 <a:ext cx="2173773" cy="4299567"/>
               </a:xfrm>
               <a:prstGeom prst="roundRect">
@@ -4823,7 +5058,7 @@
             <p:spPr>
               <a:xfrm>
                 <a:off x="1555092" y="1682386"/>
-                <a:ext cx="6855170" cy="5055345"/>
+                <a:ext cx="6855170" cy="5282594"/>
               </a:xfrm>
               <a:prstGeom prst="roundRect">
                 <a:avLst/>
@@ -4875,7 +5110,7 @@
             </p:nvSpPr>
             <p:spPr>
               <a:xfrm>
-                <a:off x="8447422" y="5981949"/>
+                <a:off x="8957159" y="6003422"/>
                 <a:ext cx="2189485" cy="755782"/>
               </a:xfrm>
               <a:prstGeom prst="roundRect">
@@ -4928,8 +5163,8 @@
             </p:nvSpPr>
             <p:spPr>
               <a:xfrm>
-                <a:off x="4127239" y="1778866"/>
-                <a:ext cx="2562810" cy="646331"/>
+                <a:off x="4117079" y="1600608"/>
+                <a:ext cx="2562810" cy="369332"/>
               </a:xfrm>
               <a:prstGeom prst="rect">
                 <a:avLst/>
@@ -4945,7 +5180,7 @@
                 <a:pPr algn="ctr"/>
                 <a:r>
                   <a:rPr lang="en-US" dirty="0"/>
-                  <a:t>Interactive test data visualization widget </a:t>
+                  <a:t>Data visualization widget </a:t>
                 </a:r>
               </a:p>
             </p:txBody>
@@ -4964,7 +5199,7 @@
             </p:nvSpPr>
             <p:spPr>
               <a:xfrm>
-                <a:off x="8648084" y="1132535"/>
+                <a:off x="9146053" y="851748"/>
                 <a:ext cx="1788160" cy="646331"/>
               </a:xfrm>
               <a:prstGeom prst="rect">
@@ -5007,8 +5242,8 @@
             </p:nvSpPr>
             <p:spPr>
               <a:xfrm>
-                <a:off x="8693180" y="6368399"/>
-                <a:ext cx="1788160" cy="369332"/>
+                <a:off x="8820585" y="6658011"/>
+                <a:ext cx="2462632" cy="646331"/>
               </a:xfrm>
               <a:prstGeom prst="rect">
                 <a:avLst/>
@@ -5025,6 +5260,138 @@
                 <a:r>
                   <a:rPr lang="en-US" dirty="0"/>
                   <a:t>Action widget</a:t>
+                </a:r>
+              </a:p>
+              <a:p>
+                <a:pPr algn="ctr"/>
+                <a:r>
+                  <a:rPr lang="en-US" dirty="0"/>
+                  <a:t>(place holder)</a:t>
+                </a:r>
+              </a:p>
+            </p:txBody>
+          </p:sp>
+          <p:sp>
+            <p:nvSpPr>
+              <p:cNvPr id="4" name="TextBox 3">
+                <a:extLst>
+                  <a:ext uri="{FF2B5EF4-FFF2-40B4-BE49-F238E27FC236}">
+                    <a16:creationId xmlns:a16="http://schemas.microsoft.com/office/drawing/2014/main" id="{703A2FB6-D21D-BB80-AE76-ABEBABC347AF}"/>
+                  </a:ext>
+                </a:extLst>
+              </p:cNvPr>
+              <p:cNvSpPr txBox="1"/>
+              <p:nvPr/>
+            </p:nvSpPr>
+            <p:spPr>
+              <a:xfrm>
+                <a:off x="1507907" y="4411803"/>
+                <a:ext cx="2072698" cy="369332"/>
+              </a:xfrm>
+              <a:prstGeom prst="rect">
+                <a:avLst/>
+              </a:prstGeom>
+              <a:noFill/>
+            </p:spPr>
+            <p:txBody>
+              <a:bodyPr wrap="square" rtlCol="0">
+                <a:spAutoFit/>
+              </a:bodyPr>
+              <a:lstStyle/>
+              <a:p>
+                <a:pPr algn="ctr"/>
+                <a:r>
+                  <a:rPr lang="en-US" dirty="0"/>
+                  <a:t>Test  info section</a:t>
+                </a:r>
+              </a:p>
+            </p:txBody>
+          </p:sp>
+          <p:sp>
+            <p:nvSpPr>
+              <p:cNvPr id="14" name="Rectangle: Rounded Corners 13">
+                <a:extLst>
+                  <a:ext uri="{FF2B5EF4-FFF2-40B4-BE49-F238E27FC236}">
+                    <a16:creationId xmlns:a16="http://schemas.microsoft.com/office/drawing/2014/main" id="{7E6B57E4-7207-1BF9-DA2D-8F20CA1CA07D}"/>
+                  </a:ext>
+                </a:extLst>
+              </p:cNvPr>
+              <p:cNvSpPr/>
+              <p:nvPr/>
+            </p:nvSpPr>
+            <p:spPr>
+              <a:xfrm>
+                <a:off x="1666239" y="4781135"/>
+                <a:ext cx="6696837" cy="1391169"/>
+              </a:xfrm>
+              <a:prstGeom prst="roundRect">
+                <a:avLst/>
+              </a:prstGeom>
+              <a:noFill/>
+              <a:ln w="38100">
+                <a:solidFill>
+                  <a:srgbClr val="00B0F0"/>
+                </a:solidFill>
+                <a:prstDash val="dash"/>
+              </a:ln>
+            </p:spPr>
+            <p:style>
+              <a:lnRef idx="2">
+                <a:schemeClr val="accent1">
+                  <a:shade val="50000"/>
+                </a:schemeClr>
+              </a:lnRef>
+              <a:fillRef idx="1">
+                <a:schemeClr val="accent1"/>
+              </a:fillRef>
+              <a:effectRef idx="0">
+                <a:schemeClr val="accent1"/>
+              </a:effectRef>
+              <a:fontRef idx="minor">
+                <a:schemeClr val="lt1"/>
+              </a:fontRef>
+            </p:style>
+            <p:txBody>
+              <a:bodyPr rtlCol="0" anchor="ctr"/>
+              <a:lstStyle/>
+              <a:p>
+                <a:pPr algn="ctr"/>
+                <a:endParaRPr lang="en-US"/>
+              </a:p>
+            </p:txBody>
+          </p:sp>
+          <p:sp>
+            <p:nvSpPr>
+              <p:cNvPr id="15" name="TextBox 14">
+                <a:extLst>
+                  <a:ext uri="{FF2B5EF4-FFF2-40B4-BE49-F238E27FC236}">
+                    <a16:creationId xmlns:a16="http://schemas.microsoft.com/office/drawing/2014/main" id="{7BDD909B-62E2-5B1A-4865-F3C71C8DC05A}"/>
+                  </a:ext>
+                </a:extLst>
+              </p:cNvPr>
+              <p:cNvSpPr txBox="1"/>
+              <p:nvPr/>
+            </p:nvSpPr>
+            <p:spPr>
+              <a:xfrm>
+                <a:off x="3797593" y="6683659"/>
+                <a:ext cx="2072698" cy="369332"/>
+              </a:xfrm>
+              <a:prstGeom prst="rect">
+                <a:avLst/>
+              </a:prstGeom>
+              <a:noFill/>
+            </p:spPr>
+            <p:txBody>
+              <a:bodyPr wrap="square" rtlCol="0">
+                <a:spAutoFit/>
+              </a:bodyPr>
+              <a:lstStyle/>
+              <a:p>
+                <a:pPr algn="ctr"/>
+                <a:r>
+                  <a:rPr lang="en-US" dirty="0"/>
+                  <a:t>Toggle curve on/off</a:t>
                 </a:r>
               </a:p>
             </p:txBody>
@@ -5154,7 +5521,7 @@
                 <a:spcPts val="3500"/>
               </a:lnSpc>
               <a:buFont typeface="Wingdings" panose="05000000000000000000" pitchFamily="2" charset="2"/>
-              <a:buChar char="v"/>
+              <a:buChar char="ü"/>
             </a:pPr>
             <a:r>
               <a:rPr lang="en-US" dirty="0"/>
@@ -5206,6 +5573,232 @@
     <p:extLst>
       <p:ext uri="{BB962C8B-B14F-4D97-AF65-F5344CB8AC3E}">
         <p14:creationId xmlns:p14="http://schemas.microsoft.com/office/powerpoint/2010/main" val="1784177501"/>
+      </p:ext>
+    </p:extLst>
+  </p:cSld>
+  <p:clrMapOvr>
+    <a:masterClrMapping/>
+  </p:clrMapOvr>
+</p:sld>
+</file>
+
+<file path=ppt/slides/slide8.xml><?xml version="1.0" encoding="utf-8"?>
+<p:sld xmlns:a="http://schemas.openxmlformats.org/drawingml/2006/main" xmlns:r="http://schemas.openxmlformats.org/officeDocument/2006/relationships" xmlns:p="http://schemas.openxmlformats.org/presentationml/2006/main">
+  <p:cSld>
+    <p:spTree>
+      <p:nvGrpSpPr>
+        <p:cNvPr id="1" name=""/>
+        <p:cNvGrpSpPr/>
+        <p:nvPr/>
+      </p:nvGrpSpPr>
+      <p:grpSpPr>
+        <a:xfrm>
+          <a:off x="0" y="0"/>
+          <a:ext cx="0" cy="0"/>
+          <a:chOff x="0" y="0"/>
+          <a:chExt cx="0" cy="0"/>
+        </a:xfrm>
+      </p:grpSpPr>
+      <p:sp>
+        <p:nvSpPr>
+          <p:cNvPr id="2" name="Title 1">
+            <a:extLst>
+              <a:ext uri="{FF2B5EF4-FFF2-40B4-BE49-F238E27FC236}">
+                <a16:creationId xmlns:a16="http://schemas.microsoft.com/office/drawing/2014/main" id="{93A4A1F5-2278-A54C-F3E8-37C708C1EC09}"/>
+              </a:ext>
+            </a:extLst>
+          </p:cNvPr>
+          <p:cNvSpPr>
+            <a:spLocks noGrp="1"/>
+          </p:cNvSpPr>
+          <p:nvPr>
+            <p:ph type="title"/>
+          </p:nvPr>
+        </p:nvSpPr>
+        <p:spPr/>
+        <p:txBody>
+          <a:bodyPr/>
+          <a:lstStyle/>
+          <a:p>
+            <a:r>
+              <a:rPr lang="en-US" dirty="0"/>
+              <a:t>Database configuration-full picture</a:t>
+            </a:r>
+          </a:p>
+        </p:txBody>
+      </p:sp>
+      <p:sp>
+        <p:nvSpPr>
+          <p:cNvPr id="3" name="Content Placeholder 2">
+            <a:extLst>
+              <a:ext uri="{FF2B5EF4-FFF2-40B4-BE49-F238E27FC236}">
+                <a16:creationId xmlns:a16="http://schemas.microsoft.com/office/drawing/2014/main" id="{409C41D6-8E43-03E8-60CD-75E30003F60E}"/>
+              </a:ext>
+            </a:extLst>
+          </p:cNvPr>
+          <p:cNvSpPr>
+            <a:spLocks noGrp="1"/>
+          </p:cNvSpPr>
+          <p:nvPr>
+            <p:ph idx="1"/>
+          </p:nvPr>
+        </p:nvSpPr>
+        <p:spPr/>
+        <p:txBody>
+          <a:bodyPr/>
+          <a:lstStyle/>
+          <a:p>
+            <a:endParaRPr lang="en-US"/>
+          </a:p>
+        </p:txBody>
+      </p:sp>
+      <p:pic>
+        <p:nvPicPr>
+          <p:cNvPr id="4" name="Picture 3">
+            <a:extLst>
+              <a:ext uri="{FF2B5EF4-FFF2-40B4-BE49-F238E27FC236}">
+                <a16:creationId xmlns:a16="http://schemas.microsoft.com/office/drawing/2014/main" id="{6B51782D-1FC0-883A-6A93-C870B8AE1DC3}"/>
+              </a:ext>
+            </a:extLst>
+          </p:cNvPr>
+          <p:cNvPicPr>
+            <a:picLocks noChangeAspect="1"/>
+          </p:cNvPicPr>
+          <p:nvPr/>
+        </p:nvPicPr>
+        <p:blipFill>
+          <a:blip r:embed="rId2"/>
+          <a:stretch>
+            <a:fillRect/>
+          </a:stretch>
+        </p:blipFill>
+        <p:spPr>
+          <a:xfrm>
+            <a:off x="3280325" y="1990731"/>
+            <a:ext cx="6264892" cy="4630572"/>
+          </a:xfrm>
+          <a:prstGeom prst="rect">
+            <a:avLst/>
+          </a:prstGeom>
+        </p:spPr>
+      </p:pic>
+    </p:spTree>
+    <p:extLst>
+      <p:ext uri="{BB962C8B-B14F-4D97-AF65-F5344CB8AC3E}">
+        <p14:creationId xmlns:p14="http://schemas.microsoft.com/office/powerpoint/2010/main" val="1410264015"/>
+      </p:ext>
+    </p:extLst>
+  </p:cSld>
+  <p:clrMapOvr>
+    <a:masterClrMapping/>
+  </p:clrMapOvr>
+</p:sld>
+</file>
+
+<file path=ppt/slides/slide9.xml><?xml version="1.0" encoding="utf-8"?>
+<p:sld xmlns:a="http://schemas.openxmlformats.org/drawingml/2006/main" xmlns:r="http://schemas.openxmlformats.org/officeDocument/2006/relationships" xmlns:p="http://schemas.openxmlformats.org/presentationml/2006/main">
+  <p:cSld>
+    <p:spTree>
+      <p:nvGrpSpPr>
+        <p:cNvPr id="1" name=""/>
+        <p:cNvGrpSpPr/>
+        <p:nvPr/>
+      </p:nvGrpSpPr>
+      <p:grpSpPr>
+        <a:xfrm>
+          <a:off x="0" y="0"/>
+          <a:ext cx="0" cy="0"/>
+          <a:chOff x="0" y="0"/>
+          <a:chExt cx="0" cy="0"/>
+        </a:xfrm>
+      </p:grpSpPr>
+      <p:sp>
+        <p:nvSpPr>
+          <p:cNvPr id="2" name="Title 1">
+            <a:extLst>
+              <a:ext uri="{FF2B5EF4-FFF2-40B4-BE49-F238E27FC236}">
+                <a16:creationId xmlns:a16="http://schemas.microsoft.com/office/drawing/2014/main" id="{805B722A-6500-32A3-3A13-454734812F33}"/>
+              </a:ext>
+            </a:extLst>
+          </p:cNvPr>
+          <p:cNvSpPr>
+            <a:spLocks noGrp="1"/>
+          </p:cNvSpPr>
+          <p:nvPr>
+            <p:ph type="title"/>
+          </p:nvPr>
+        </p:nvSpPr>
+        <p:spPr/>
+        <p:txBody>
+          <a:bodyPr/>
+          <a:lstStyle/>
+          <a:p>
+            <a:r>
+              <a:rPr lang="en-US" dirty="0"/>
+              <a:t>Data engineering needed before analysis</a:t>
+            </a:r>
+          </a:p>
+        </p:txBody>
+      </p:sp>
+      <p:sp>
+        <p:nvSpPr>
+          <p:cNvPr id="3" name="Content Placeholder 2">
+            <a:extLst>
+              <a:ext uri="{FF2B5EF4-FFF2-40B4-BE49-F238E27FC236}">
+                <a16:creationId xmlns:a16="http://schemas.microsoft.com/office/drawing/2014/main" id="{A77E2E5A-830A-9860-09F8-7F98CD18974E}"/>
+              </a:ext>
+            </a:extLst>
+          </p:cNvPr>
+          <p:cNvSpPr>
+            <a:spLocks noGrp="1"/>
+          </p:cNvSpPr>
+          <p:nvPr>
+            <p:ph idx="1"/>
+          </p:nvPr>
+        </p:nvSpPr>
+        <p:spPr/>
+        <p:txBody>
+          <a:bodyPr/>
+          <a:lstStyle/>
+          <a:p>
+            <a:endParaRPr lang="en-US"/>
+          </a:p>
+        </p:txBody>
+      </p:sp>
+      <p:pic>
+        <p:nvPicPr>
+          <p:cNvPr id="4" name="Picture 3">
+            <a:extLst>
+              <a:ext uri="{FF2B5EF4-FFF2-40B4-BE49-F238E27FC236}">
+                <a16:creationId xmlns:a16="http://schemas.microsoft.com/office/drawing/2014/main" id="{4399E95A-FC6A-A238-C37E-60EE0A7E9F7C}"/>
+              </a:ext>
+            </a:extLst>
+          </p:cNvPr>
+          <p:cNvPicPr>
+            <a:picLocks noChangeAspect="1"/>
+          </p:cNvPicPr>
+          <p:nvPr/>
+        </p:nvPicPr>
+        <p:blipFill>
+          <a:blip r:embed="rId2"/>
+          <a:stretch>
+            <a:fillRect/>
+          </a:stretch>
+        </p:blipFill>
+        <p:spPr>
+          <a:xfrm>
+            <a:off x="2402003" y="1895525"/>
+            <a:ext cx="7630590" cy="4858428"/>
+          </a:xfrm>
+          <a:prstGeom prst="rect">
+            <a:avLst/>
+          </a:prstGeom>
+        </p:spPr>
+      </p:pic>
+    </p:spTree>
+    <p:extLst>
+      <p:ext uri="{BB962C8B-B14F-4D97-AF65-F5344CB8AC3E}">
+        <p14:creationId xmlns:p14="http://schemas.microsoft.com/office/powerpoint/2010/main" val="3412562093"/>
       </p:ext>
     </p:extLst>
   </p:cSld>

</xml_diff>